<commit_message>
update from pokemons to rl animals
</commit_message>
<xml_diff>
--- a/Pokemon visual recognision.pptx
+++ b/Pokemon visual recognision.pptx
@@ -9,6 +9,7 @@
     <p:sldId id="258" r:id="rId3"/>
     <p:sldId id="259" r:id="rId4"/>
     <p:sldId id="260" r:id="rId5"/>
+    <p:sldId id="261" r:id="rId6"/>
   </p:sldIdLst>
   <p:sldSz cx="12192000" cy="6858000"/>
   <p:notesSz cx="6858000" cy="9144000"/>
@@ -340,7 +341,7 @@
             <a:fld id="{5586B75A-687E-405C-8A0B-8D00578BA2C3}" type="datetimeFigureOut">
               <a:rPr lang="en-US" dirty="0"/>
               <a:pPr/>
-              <a:t>11/14/2019</a:t>
+              <a:t>12/1/2019</a:t>
             </a:fld>
             <a:endParaRPr lang="en-US" dirty="0"/>
           </a:p>
@@ -507,7 +508,7 @@
             <a:fld id="{5586B75A-687E-405C-8A0B-8D00578BA2C3}" type="datetimeFigureOut">
               <a:rPr lang="en-US" dirty="0"/>
               <a:pPr/>
-              <a:t>11/14/2019</a:t>
+              <a:t>12/1/2019</a:t>
             </a:fld>
             <a:endParaRPr lang="en-US" dirty="0"/>
           </a:p>
@@ -684,7 +685,7 @@
             <a:fld id="{5586B75A-687E-405C-8A0B-8D00578BA2C3}" type="datetimeFigureOut">
               <a:rPr lang="en-US" dirty="0"/>
               <a:pPr/>
-              <a:t>11/14/2019</a:t>
+              <a:t>12/1/2019</a:t>
             </a:fld>
             <a:endParaRPr lang="en-US" dirty="0"/>
           </a:p>
@@ -851,7 +852,7 @@
             <a:fld id="{5586B75A-687E-405C-8A0B-8D00578BA2C3}" type="datetimeFigureOut">
               <a:rPr lang="en-US" dirty="0"/>
               <a:pPr/>
-              <a:t>11/14/2019</a:t>
+              <a:t>12/1/2019</a:t>
             </a:fld>
             <a:endParaRPr lang="en-US" dirty="0"/>
           </a:p>
@@ -1106,7 +1107,7 @@
             <a:fld id="{5586B75A-687E-405C-8A0B-8D00578BA2C3}" type="datetimeFigureOut">
               <a:rPr lang="en-US" dirty="0"/>
               <a:pPr/>
-              <a:t>11/14/2019</a:t>
+              <a:t>12/1/2019</a:t>
             </a:fld>
             <a:endParaRPr lang="en-US" dirty="0"/>
           </a:p>
@@ -1391,7 +1392,7 @@
             <a:fld id="{5586B75A-687E-405C-8A0B-8D00578BA2C3}" type="datetimeFigureOut">
               <a:rPr lang="en-US" dirty="0"/>
               <a:pPr/>
-              <a:t>11/14/2019</a:t>
+              <a:t>12/1/2019</a:t>
             </a:fld>
             <a:endParaRPr lang="en-US" dirty="0"/>
           </a:p>
@@ -1830,7 +1831,7 @@
             <a:fld id="{5586B75A-687E-405C-8A0B-8D00578BA2C3}" type="datetimeFigureOut">
               <a:rPr lang="en-US" dirty="0"/>
               <a:pPr/>
-              <a:t>11/14/2019</a:t>
+              <a:t>12/1/2019</a:t>
             </a:fld>
             <a:endParaRPr lang="en-US" dirty="0"/>
           </a:p>
@@ -1945,7 +1946,7 @@
             <a:fld id="{5586B75A-687E-405C-8A0B-8D00578BA2C3}" type="datetimeFigureOut">
               <a:rPr lang="en-US" dirty="0"/>
               <a:pPr/>
-              <a:t>11/14/2019</a:t>
+              <a:t>12/1/2019</a:t>
             </a:fld>
             <a:endParaRPr lang="en-US" dirty="0"/>
           </a:p>
@@ -2037,7 +2038,7 @@
             <a:fld id="{5586B75A-687E-405C-8A0B-8D00578BA2C3}" type="datetimeFigureOut">
               <a:rPr lang="en-US" dirty="0"/>
               <a:pPr/>
-              <a:t>11/14/2019</a:t>
+              <a:t>12/1/2019</a:t>
             </a:fld>
             <a:endParaRPr lang="en-US" dirty="0"/>
           </a:p>
@@ -2322,7 +2323,7 @@
             <a:fld id="{5586B75A-687E-405C-8A0B-8D00578BA2C3}" type="datetimeFigureOut">
               <a:rPr lang="en-US" dirty="0"/>
               <a:pPr/>
-              <a:t>11/14/2019</a:t>
+              <a:t>12/1/2019</a:t>
             </a:fld>
             <a:endParaRPr lang="en-US" dirty="0"/>
           </a:p>
@@ -2592,7 +2593,7 @@
             <a:fld id="{5586B75A-687E-405C-8A0B-8D00578BA2C3}" type="datetimeFigureOut">
               <a:rPr lang="en-US" dirty="0"/>
               <a:pPr/>
-              <a:t>11/14/2019</a:t>
+              <a:t>12/1/2019</a:t>
             </a:fld>
             <a:endParaRPr lang="en-US" dirty="0"/>
           </a:p>
@@ -2886,7 +2887,7 @@
             <a:fld id="{5586B75A-687E-405C-8A0B-8D00578BA2C3}" type="datetimeFigureOut">
               <a:rPr lang="en-US" dirty="0"/>
               <a:pPr/>
-              <a:t>11/14/2019</a:t>
+              <a:t>12/1/2019</a:t>
             </a:fld>
             <a:endParaRPr lang="en-US" dirty="0"/>
           </a:p>
@@ -4058,21 +4059,24 @@
             </a:r>
           </a:p>
           <a:p>
-            <a:endParaRPr lang="pl-PL" dirty="0"/>
-          </a:p>
-          <a:p>
-            <a:r>
-              <a:rPr lang="pl-PL" dirty="0"/>
-              <a:t>Dodanie większej ilości stworków do rozpoznawania – obecnie jest ich jedynie 7. </a:t>
-            </a:r>
-          </a:p>
-          <a:p>
+            <a:pPr marL="0" indent="0">
+              <a:buNone/>
+            </a:pPr>
             <a:endParaRPr lang="pl-PL" dirty="0"/>
           </a:p>
           <a:p>
             <a:r>
               <a:rPr lang="pl-PL" dirty="0"/>
               <a:t>Czytelny GUI</a:t>
+            </a:r>
+          </a:p>
+          <a:p>
+            <a:endParaRPr lang="pl-PL" dirty="0"/>
+          </a:p>
+          <a:p>
+            <a:r>
+              <a:rPr lang="pl-PL" dirty="0"/>
+              <a:t>Zamiana bazy danych na prawdziwe zwierzęta</a:t>
             </a:r>
           </a:p>
         </p:txBody>
@@ -4128,6 +4132,114 @@
     <p:extLst>
       <p:ext uri="{BB962C8B-B14F-4D97-AF65-F5344CB8AC3E}">
         <p14:creationId xmlns:p14="http://schemas.microsoft.com/office/powerpoint/2010/main" val="3050127899"/>
+      </p:ext>
+    </p:extLst>
+  </p:cSld>
+  <p:clrMapOvr>
+    <a:masterClrMapping/>
+  </p:clrMapOvr>
+</p:sld>
+</file>
+
+<file path=ppt/slides/slide5.xml><?xml version="1.0" encoding="utf-8"?>
+<p:sld xmlns:a="http://schemas.openxmlformats.org/drawingml/2006/main" xmlns:r="http://schemas.openxmlformats.org/officeDocument/2006/relationships" xmlns:p="http://schemas.openxmlformats.org/presentationml/2006/main">
+  <p:cSld>
+    <p:spTree>
+      <p:nvGrpSpPr>
+        <p:cNvPr id="1" name=""/>
+        <p:cNvGrpSpPr/>
+        <p:nvPr/>
+      </p:nvGrpSpPr>
+      <p:grpSpPr>
+        <a:xfrm>
+          <a:off x="0" y="0"/>
+          <a:ext cx="0" cy="0"/>
+          <a:chOff x="0" y="0"/>
+          <a:chExt cx="0" cy="0"/>
+        </a:xfrm>
+      </p:grpSpPr>
+      <p:sp>
+        <p:nvSpPr>
+          <p:cNvPr id="2" name="Tytuł 1">
+            <a:extLst>
+              <a:ext uri="{FF2B5EF4-FFF2-40B4-BE49-F238E27FC236}">
+                <a16:creationId xmlns:a16="http://schemas.microsoft.com/office/drawing/2014/main" id="{D8A5E871-1CEF-42D9-B1E0-9C53EBE8AC4E}"/>
+              </a:ext>
+            </a:extLst>
+          </p:cNvPr>
+          <p:cNvSpPr>
+            <a:spLocks noGrp="1"/>
+          </p:cNvSpPr>
+          <p:nvPr>
+            <p:ph type="title"/>
+          </p:nvPr>
+        </p:nvSpPr>
+        <p:spPr/>
+        <p:txBody>
+          <a:bodyPr/>
+          <a:lstStyle/>
+          <a:p>
+            <a:r>
+              <a:rPr lang="pl-PL" dirty="0"/>
+              <a:t>From </a:t>
+            </a:r>
+            <a:r>
+              <a:rPr lang="pl-PL" dirty="0" err="1"/>
+              <a:t>Pokemons</a:t>
+            </a:r>
+            <a:r>
+              <a:rPr lang="pl-PL" dirty="0"/>
+              <a:t> to real life </a:t>
+            </a:r>
+            <a:r>
+              <a:rPr lang="pl-PL" dirty="0" err="1"/>
+              <a:t>animals</a:t>
+            </a:r>
+            <a:endParaRPr lang="pl-PL" dirty="0"/>
+          </a:p>
+        </p:txBody>
+      </p:sp>
+      <p:sp>
+        <p:nvSpPr>
+          <p:cNvPr id="3" name="Symbol zastępczy zawartości 2">
+            <a:extLst>
+              <a:ext uri="{FF2B5EF4-FFF2-40B4-BE49-F238E27FC236}">
+                <a16:creationId xmlns:a16="http://schemas.microsoft.com/office/drawing/2014/main" id="{658F4056-AE65-4354-BDD7-6899BDDDF098}"/>
+              </a:ext>
+            </a:extLst>
+          </p:cNvPr>
+          <p:cNvSpPr>
+            <a:spLocks noGrp="1"/>
+          </p:cNvSpPr>
+          <p:nvPr>
+            <p:ph idx="1"/>
+          </p:nvPr>
+        </p:nvSpPr>
+        <p:spPr/>
+        <p:txBody>
+          <a:bodyPr/>
+          <a:lstStyle/>
+          <a:p>
+            <a:r>
+              <a:rPr lang="pl-PL" dirty="0"/>
+              <a:t>Planujemy przemodelowanie sieci niewielkim kosztem na rozpoznawanie niebezpiecznych gatunków zwierząt</a:t>
+            </a:r>
+          </a:p>
+          <a:p>
+            <a:endParaRPr lang="pl-PL" dirty="0"/>
+          </a:p>
+          <a:p>
+            <a:r>
+              <a:rPr lang="pl-PL" dirty="0"/>
+              <a:t>Program będzie przydatny dla turystów  udających się do krajów gdzie stworzenia żywe są nieco mniej przyjazne niż w Polsce, ale także dla mieszkańców niebezpiecznych terenów. </a:t>
+            </a:r>
+          </a:p>
+        </p:txBody>
+      </p:sp>
+    </p:spTree>
+    <p:extLst>
+      <p:ext uri="{BB962C8B-B14F-4D97-AF65-F5344CB8AC3E}">
+        <p14:creationId xmlns:p14="http://schemas.microsoft.com/office/powerpoint/2010/main" val="1172537511"/>
       </p:ext>
     </p:extLst>
   </p:cSld>

</xml_diff>